<commit_message>
deleted:    Dashboard/Defenders/~$WingBacks_male.xlsx 	modified:   Dashboard/FootballStyle.pptx 	deleted:    Dashboard/GK/~$GK_Female.xlsx 	deleted:    Dashboard/~$FootballStyle.pptx 	modified:   FEMALE/EDA/game_readers_female.sql 	modified:   FEMALE/female_players.xlsx 	modified:   MALE/EDA/game_readers_male.sql 	modified:   MALE/final_male.csv 	modified:   MALE/male_players.xlsx
</commit_message>
<xml_diff>
--- a/Dashboard/FootballStyle.pptx
+++ b/Dashboard/FootballStyle.pptx
@@ -3426,7 +3426,7 @@
             </a:pPr>
             <a:r>
               <a:rPr lang="en-US" sz="1200" dirty="0"/>
-              <a:t>1Spain and the US are renowned for producing quality defenders in the men's and women's categories, respectively.</a:t>
+              <a:t>Spain and the US are renowned for producing quality defenders in the men's and women's categories, respectively.</a:t>
             </a:r>
           </a:p>
           <a:p>
@@ -4158,7 +4158,7 @@
         <p:spPr>
           <a:xfrm>
             <a:off x="405114" y="1111170"/>
-            <a:ext cx="2777924" cy="276999"/>
+            <a:ext cx="2777924" cy="830997"/>
           </a:xfrm>
           <a:prstGeom prst="rect">
             <a:avLst/>
@@ -4171,13 +4171,9 @@
           </a:bodyPr>
           <a:lstStyle/>
           <a:p>
-            <a:pPr marL="171450" indent="-171450">
-              <a:buFont typeface="Arial" panose="020B0604020202020204" pitchFamily="34" charset="0"/>
-              <a:buChar char="•"/>
-            </a:pPr>
             <a:r>
               <a:rPr lang="en-US" sz="1200" dirty="0"/>
-              <a:t>For Goal</a:t>
+              <a:t>For female Goalkeeper, if the impact is less than 4, the club is playing counter attacking football otherwise attacking football</a:t>
             </a:r>
           </a:p>
         </p:txBody>

</xml_diff>